<commit_message>
Fix slide similarity test for ArtisticEffect
</commit_message>
<xml_diff>
--- a/doc/test/SyncLab/SyncLab_ArtisticEffect.pptx
+++ b/doc/test/SyncLab/SyncLab_ArtisticEffect.pptx
@@ -8,16 +8,18 @@
     <p:sldMasterId id="2147483684" r:id="rId4"/>
   </p:sldMasterIdLst>
   <p:notesMasterIdLst>
-    <p:notesMasterId r:id="rId12"/>
+    <p:notesMasterId r:id="rId14"/>
   </p:notesMasterIdLst>
   <p:sldIdLst>
     <p:sldId id="287" r:id="rId5"/>
     <p:sldId id="256" r:id="rId6"/>
     <p:sldId id="311" r:id="rId7"/>
-    <p:sldId id="294" r:id="rId8"/>
-    <p:sldId id="312" r:id="rId9"/>
+    <p:sldId id="320" r:id="rId8"/>
+    <p:sldId id="325" r:id="rId9"/>
     <p:sldId id="314" r:id="rId10"/>
     <p:sldId id="313" r:id="rId11"/>
+    <p:sldId id="326" r:id="rId12"/>
+    <p:sldId id="324" r:id="rId13"/>
   </p:sldIdLst>
   <p:sldSz cx="9144000" cy="6858000" type="screen4x3"/>
   <p:notesSz cx="6858000" cy="9144000"/>
@@ -128,10 +130,24 @@
         <p14:section name="Artistic Effects" id="{A3A2B0AB-762C-4281-AA7B-EF7E134E0DC4}">
           <p14:sldIdLst>
             <p14:sldId id="311"/>
-            <p14:sldId id="294"/>
-            <p14:sldId id="312"/>
+          </p14:sldIdLst>
+        </p14:section>
+        <p14:section name="Set ArtisticEffect" id="{3C9A3648-D1F3-4D06-9D40-0480CEFB518D}">
+          <p14:sldIdLst>
+            <p14:sldId id="320"/>
+            <p14:sldId id="325"/>
+          </p14:sldIdLst>
+        </p14:section>
+        <p14:section name="Replace ArtisticEffect" id="{58AA8247-C023-4D5C-BA9F-9E31E7FF0F63}">
+          <p14:sldIdLst>
             <p14:sldId id="314"/>
             <p14:sldId id="313"/>
+          </p14:sldIdLst>
+        </p14:section>
+        <p14:section name="Unused In Testing" id="{E243E077-5B65-414D-AD52-F6A72AAC9FF9}">
+          <p14:sldIdLst>
+            <p14:sldId id="326"/>
+            <p14:sldId id="324"/>
           </p14:sldIdLst>
         </p14:section>
       </p14:sectionLst>
@@ -229,7 +245,7 @@
           <a:p>
             <a:fld id="{43E32005-3A63-48D2-8C73-BF5F95786EBD}" type="datetimeFigureOut">
               <a:rPr lang="en-US" smtClean="0"/>
-              <a:t>4/1/2018</a:t>
+              <a:t>4/11/2018</a:t>
             </a:fld>
             <a:endParaRPr lang="en-US"/>
           </a:p>
@@ -573,7 +589,7 @@
     </p:spTree>
     <p:extLst>
       <p:ext uri="{BB962C8B-B14F-4D97-AF65-F5344CB8AC3E}">
-        <p14:creationId xmlns:p14="http://schemas.microsoft.com/office/powerpoint/2010/main" val="1791717471"/>
+        <p14:creationId xmlns:p14="http://schemas.microsoft.com/office/powerpoint/2010/main" val="3066024938"/>
       </p:ext>
     </p:extLst>
   </p:cSld>
@@ -660,7 +676,7 @@
     </p:spTree>
     <p:extLst>
       <p:ext uri="{BB962C8B-B14F-4D97-AF65-F5344CB8AC3E}">
-        <p14:creationId xmlns:p14="http://schemas.microsoft.com/office/powerpoint/2010/main" val="1887762085"/>
+        <p14:creationId xmlns:p14="http://schemas.microsoft.com/office/powerpoint/2010/main" val="1804902309"/>
       </p:ext>
     </p:extLst>
   </p:cSld>
@@ -844,6 +860,180 @@
 </p:notes>
 </file>
 
+<file path=ppt/notesSlides/notesSlide5.xml><?xml version="1.0" encoding="utf-8"?>
+<p:notes xmlns:a="http://schemas.openxmlformats.org/drawingml/2006/main" xmlns:r="http://schemas.openxmlformats.org/officeDocument/2006/relationships" xmlns:p="http://schemas.openxmlformats.org/presentationml/2006/main">
+  <p:cSld>
+    <p:spTree>
+      <p:nvGrpSpPr>
+        <p:cNvPr id="1" name=""/>
+        <p:cNvGrpSpPr/>
+        <p:nvPr/>
+      </p:nvGrpSpPr>
+      <p:grpSpPr>
+        <a:xfrm>
+          <a:off x="0" y="0"/>
+          <a:ext cx="0" cy="0"/>
+          <a:chOff x="0" y="0"/>
+          <a:chExt cx="0" cy="0"/>
+        </a:xfrm>
+      </p:grpSpPr>
+      <p:sp>
+        <p:nvSpPr>
+          <p:cNvPr id="2" name="Slide Image Placeholder 1"/>
+          <p:cNvSpPr>
+            <a:spLocks noGrp="1" noRot="1" noChangeAspect="1"/>
+          </p:cNvSpPr>
+          <p:nvPr>
+            <p:ph type="sldImg"/>
+          </p:nvPr>
+        </p:nvSpPr>
+        <p:spPr/>
+      </p:sp>
+      <p:sp>
+        <p:nvSpPr>
+          <p:cNvPr id="3" name="Notes Placeholder 2"/>
+          <p:cNvSpPr>
+            <a:spLocks noGrp="1"/>
+          </p:cNvSpPr>
+          <p:nvPr>
+            <p:ph type="body" idx="1"/>
+          </p:nvPr>
+        </p:nvSpPr>
+        <p:spPr/>
+        <p:txBody>
+          <a:bodyPr/>
+          <a:lstStyle/>
+          <a:p>
+            <a:r>
+              <a:rPr lang="en-US" dirty="0"/>
+              <a:t>Original Shapes</a:t>
+            </a:r>
+          </a:p>
+        </p:txBody>
+      </p:sp>
+      <p:sp>
+        <p:nvSpPr>
+          <p:cNvPr id="4" name="Slide Number Placeholder 3"/>
+          <p:cNvSpPr>
+            <a:spLocks noGrp="1"/>
+          </p:cNvSpPr>
+          <p:nvPr>
+            <p:ph type="sldNum" sz="quarter" idx="10"/>
+          </p:nvPr>
+        </p:nvSpPr>
+        <p:spPr/>
+        <p:txBody>
+          <a:bodyPr/>
+          <a:lstStyle/>
+          <a:p>
+            <a:fld id="{0FE7C38A-472B-4221-8E00-509E1DA863EC}" type="slidenum">
+              <a:rPr lang="en-US" smtClean="0"/>
+              <a:t>8</a:t>
+            </a:fld>
+            <a:endParaRPr lang="en-US"/>
+          </a:p>
+        </p:txBody>
+      </p:sp>
+    </p:spTree>
+    <p:extLst>
+      <p:ext uri="{BB962C8B-B14F-4D97-AF65-F5344CB8AC3E}">
+        <p14:creationId xmlns:p14="http://schemas.microsoft.com/office/powerpoint/2010/main" val="3451016266"/>
+      </p:ext>
+    </p:extLst>
+  </p:cSld>
+  <p:clrMapOvr>
+    <a:masterClrMapping/>
+  </p:clrMapOvr>
+</p:notes>
+</file>
+
+<file path=ppt/notesSlides/notesSlide6.xml><?xml version="1.0" encoding="utf-8"?>
+<p:notes xmlns:a="http://schemas.openxmlformats.org/drawingml/2006/main" xmlns:r="http://schemas.openxmlformats.org/officeDocument/2006/relationships" xmlns:p="http://schemas.openxmlformats.org/presentationml/2006/main">
+  <p:cSld>
+    <p:spTree>
+      <p:nvGrpSpPr>
+        <p:cNvPr id="1" name=""/>
+        <p:cNvGrpSpPr/>
+        <p:nvPr/>
+      </p:nvGrpSpPr>
+      <p:grpSpPr>
+        <a:xfrm>
+          <a:off x="0" y="0"/>
+          <a:ext cx="0" cy="0"/>
+          <a:chOff x="0" y="0"/>
+          <a:chExt cx="0" cy="0"/>
+        </a:xfrm>
+      </p:grpSpPr>
+      <p:sp>
+        <p:nvSpPr>
+          <p:cNvPr id="2" name="Slide Image Placeholder 1"/>
+          <p:cNvSpPr>
+            <a:spLocks noGrp="1" noRot="1" noChangeAspect="1"/>
+          </p:cNvSpPr>
+          <p:nvPr>
+            <p:ph type="sldImg"/>
+          </p:nvPr>
+        </p:nvSpPr>
+        <p:spPr/>
+      </p:sp>
+      <p:sp>
+        <p:nvSpPr>
+          <p:cNvPr id="3" name="Notes Placeholder 2"/>
+          <p:cNvSpPr>
+            <a:spLocks noGrp="1"/>
+          </p:cNvSpPr>
+          <p:nvPr>
+            <p:ph type="body" idx="1"/>
+          </p:nvPr>
+        </p:nvSpPr>
+        <p:spPr/>
+        <p:txBody>
+          <a:bodyPr/>
+          <a:lstStyle/>
+          <a:p>
+            <a:r>
+              <a:rPr lang="en-US" dirty="0"/>
+              <a:t>Original Shapes</a:t>
+            </a:r>
+          </a:p>
+        </p:txBody>
+      </p:sp>
+      <p:sp>
+        <p:nvSpPr>
+          <p:cNvPr id="4" name="Slide Number Placeholder 3"/>
+          <p:cNvSpPr>
+            <a:spLocks noGrp="1"/>
+          </p:cNvSpPr>
+          <p:nvPr>
+            <p:ph type="sldNum" sz="quarter" idx="10"/>
+          </p:nvPr>
+        </p:nvSpPr>
+        <p:spPr/>
+        <p:txBody>
+          <a:bodyPr/>
+          <a:lstStyle/>
+          <a:p>
+            <a:fld id="{0FE7C38A-472B-4221-8E00-509E1DA863EC}" type="slidenum">
+              <a:rPr lang="en-US" smtClean="0"/>
+              <a:t>9</a:t>
+            </a:fld>
+            <a:endParaRPr lang="en-US"/>
+          </a:p>
+        </p:txBody>
+      </p:sp>
+    </p:spTree>
+    <p:extLst>
+      <p:ext uri="{BB962C8B-B14F-4D97-AF65-F5344CB8AC3E}">
+        <p14:creationId xmlns:p14="http://schemas.microsoft.com/office/powerpoint/2010/main" val="3428293229"/>
+      </p:ext>
+    </p:extLst>
+  </p:cSld>
+  <p:clrMapOvr>
+    <a:masterClrMapping/>
+  </p:clrMapOvr>
+</p:notes>
+</file>
+
 <file path=ppt/slideLayouts/slideLayout1.xml><?xml version="1.0" encoding="utf-8"?>
 <p:sldLayout xmlns:a="http://schemas.openxmlformats.org/drawingml/2006/main" xmlns:r="http://schemas.openxmlformats.org/officeDocument/2006/relationships" xmlns:p="http://schemas.openxmlformats.org/presentationml/2006/main" type="title" preserve="1">
   <p:cSld name="Title Slide">
@@ -1023,7 +1213,7 @@
           <a:p>
             <a:fld id="{699DC775-C286-4358-8C92-D7E584E969B3}" type="datetimeFigureOut">
               <a:rPr lang="en-US" smtClean="0"/>
-              <a:t>4/1/2018</a:t>
+              <a:t>4/11/2018</a:t>
             </a:fld>
             <a:endParaRPr lang="en-US"/>
           </a:p>
@@ -1191,7 +1381,7 @@
           <a:p>
             <a:fld id="{699DC775-C286-4358-8C92-D7E584E969B3}" type="datetimeFigureOut">
               <a:rPr lang="en-US" smtClean="0"/>
-              <a:t>4/1/2018</a:t>
+              <a:t>4/11/2018</a:t>
             </a:fld>
             <a:endParaRPr lang="en-US"/>
           </a:p>
@@ -1369,7 +1559,7 @@
           <a:p>
             <a:fld id="{699DC775-C286-4358-8C92-D7E584E969B3}" type="datetimeFigureOut">
               <a:rPr lang="en-US" smtClean="0"/>
-              <a:t>4/1/2018</a:t>
+              <a:t>4/11/2018</a:t>
             </a:fld>
             <a:endParaRPr lang="en-US"/>
           </a:p>
@@ -1609,7 +1799,7 @@
           <a:p>
             <a:fld id="{699DC775-C286-4358-8C92-D7E584E969B3}" type="datetimeFigureOut">
               <a:rPr lang="en-US" smtClean="0"/>
-              <a:t>4/1/2018</a:t>
+              <a:t>4/11/2018</a:t>
             </a:fld>
             <a:endParaRPr lang="en-US"/>
           </a:p>
@@ -1777,7 +1967,7 @@
           <a:p>
             <a:fld id="{699DC775-C286-4358-8C92-D7E584E969B3}" type="datetimeFigureOut">
               <a:rPr lang="en-US" smtClean="0"/>
-              <a:t>4/1/2018</a:t>
+              <a:t>4/11/2018</a:t>
             </a:fld>
             <a:endParaRPr lang="en-US"/>
           </a:p>
@@ -2022,7 +2212,7 @@
           <a:p>
             <a:fld id="{699DC775-C286-4358-8C92-D7E584E969B3}" type="datetimeFigureOut">
               <a:rPr lang="en-US" smtClean="0"/>
-              <a:t>4/1/2018</a:t>
+              <a:t>4/11/2018</a:t>
             </a:fld>
             <a:endParaRPr lang="en-US"/>
           </a:p>
@@ -2307,7 +2497,7 @@
           <a:p>
             <a:fld id="{699DC775-C286-4358-8C92-D7E584E969B3}" type="datetimeFigureOut">
               <a:rPr lang="en-US" smtClean="0"/>
-              <a:t>4/1/2018</a:t>
+              <a:t>4/11/2018</a:t>
             </a:fld>
             <a:endParaRPr lang="en-US"/>
           </a:p>
@@ -2726,7 +2916,7 @@
           <a:p>
             <a:fld id="{699DC775-C286-4358-8C92-D7E584E969B3}" type="datetimeFigureOut">
               <a:rPr lang="en-US" smtClean="0"/>
-              <a:t>4/1/2018</a:t>
+              <a:t>4/11/2018</a:t>
             </a:fld>
             <a:endParaRPr lang="en-US"/>
           </a:p>
@@ -2843,7 +3033,7 @@
           <a:p>
             <a:fld id="{699DC775-C286-4358-8C92-D7E584E969B3}" type="datetimeFigureOut">
               <a:rPr lang="en-US" smtClean="0"/>
-              <a:t>4/1/2018</a:t>
+              <a:t>4/11/2018</a:t>
             </a:fld>
             <a:endParaRPr lang="en-US"/>
           </a:p>
@@ -2938,7 +3128,7 @@
           <a:p>
             <a:fld id="{699DC775-C286-4358-8C92-D7E584E969B3}" type="datetimeFigureOut">
               <a:rPr lang="en-US" smtClean="0"/>
-              <a:t>4/1/2018</a:t>
+              <a:t>4/11/2018</a:t>
             </a:fld>
             <a:endParaRPr lang="en-US"/>
           </a:p>
@@ -3213,7 +3403,7 @@
           <a:p>
             <a:fld id="{699DC775-C286-4358-8C92-D7E584E969B3}" type="datetimeFigureOut">
               <a:rPr lang="en-US" smtClean="0"/>
-              <a:t>4/1/2018</a:t>
+              <a:t>4/11/2018</a:t>
             </a:fld>
             <a:endParaRPr lang="en-US"/>
           </a:p>
@@ -3381,7 +3571,7 @@
           <a:p>
             <a:fld id="{699DC775-C286-4358-8C92-D7E584E969B3}" type="datetimeFigureOut">
               <a:rPr lang="en-US" smtClean="0"/>
-              <a:t>4/1/2018</a:t>
+              <a:t>4/11/2018</a:t>
             </a:fld>
             <a:endParaRPr lang="en-US"/>
           </a:p>
@@ -3633,7 +3823,7 @@
           <a:p>
             <a:fld id="{699DC775-C286-4358-8C92-D7E584E969B3}" type="datetimeFigureOut">
               <a:rPr lang="en-US" smtClean="0"/>
-              <a:t>4/1/2018</a:t>
+              <a:t>4/11/2018</a:t>
             </a:fld>
             <a:endParaRPr lang="en-US"/>
           </a:p>
@@ -3801,7 +3991,7 @@
           <a:p>
             <a:fld id="{699DC775-C286-4358-8C92-D7E584E969B3}" type="datetimeFigureOut">
               <a:rPr lang="en-US" smtClean="0"/>
-              <a:t>4/1/2018</a:t>
+              <a:t>4/11/2018</a:t>
             </a:fld>
             <a:endParaRPr lang="en-US"/>
           </a:p>
@@ -3979,7 +4169,7 @@
           <a:p>
             <a:fld id="{699DC775-C286-4358-8C92-D7E584E969B3}" type="datetimeFigureOut">
               <a:rPr lang="en-US" smtClean="0"/>
-              <a:t>4/1/2018</a:t>
+              <a:t>4/11/2018</a:t>
             </a:fld>
             <a:endParaRPr lang="en-US"/>
           </a:p>
@@ -4227,7 +4417,7 @@
           <a:p>
             <a:fld id="{699DC775-C286-4358-8C92-D7E584E969B3}" type="datetimeFigureOut">
               <a:rPr lang="en-US" smtClean="0"/>
-              <a:t>4/1/2018</a:t>
+              <a:t>4/11/2018</a:t>
             </a:fld>
             <a:endParaRPr lang="en-US"/>
           </a:p>
@@ -4403,7 +4593,7 @@
           <a:p>
             <a:fld id="{699DC775-C286-4358-8C92-D7E584E969B3}" type="datetimeFigureOut">
               <a:rPr lang="en-US" smtClean="0"/>
-              <a:t>4/1/2018</a:t>
+              <a:t>4/11/2018</a:t>
             </a:fld>
             <a:endParaRPr lang="en-US"/>
           </a:p>
@@ -4656,7 +4846,7 @@
           <a:p>
             <a:fld id="{699DC775-C286-4358-8C92-D7E584E969B3}" type="datetimeFigureOut">
               <a:rPr lang="en-US" smtClean="0"/>
-              <a:t>4/1/2018</a:t>
+              <a:t>4/11/2018</a:t>
             </a:fld>
             <a:endParaRPr lang="en-US"/>
           </a:p>
@@ -4949,7 +5139,7 @@
           <a:p>
             <a:fld id="{699DC775-C286-4358-8C92-D7E584E969B3}" type="datetimeFigureOut">
               <a:rPr lang="en-US" smtClean="0"/>
-              <a:t>4/1/2018</a:t>
+              <a:t>4/11/2018</a:t>
             </a:fld>
             <a:endParaRPr lang="en-US"/>
           </a:p>
@@ -5376,7 +5566,7 @@
           <a:p>
             <a:fld id="{699DC775-C286-4358-8C92-D7E584E969B3}" type="datetimeFigureOut">
               <a:rPr lang="en-US" smtClean="0"/>
-              <a:t>4/1/2018</a:t>
+              <a:t>4/11/2018</a:t>
             </a:fld>
             <a:endParaRPr lang="en-US"/>
           </a:p>
@@ -5501,7 +5691,7 @@
           <a:p>
             <a:fld id="{699DC775-C286-4358-8C92-D7E584E969B3}" type="datetimeFigureOut">
               <a:rPr lang="en-US" smtClean="0"/>
-              <a:t>4/1/2018</a:t>
+              <a:t>4/11/2018</a:t>
             </a:fld>
             <a:endParaRPr lang="en-US"/>
           </a:p>
@@ -5604,7 +5794,7 @@
           <a:p>
             <a:fld id="{699DC775-C286-4358-8C92-D7E584E969B3}" type="datetimeFigureOut">
               <a:rPr lang="en-US" smtClean="0"/>
-              <a:t>4/1/2018</a:t>
+              <a:t>4/11/2018</a:t>
             </a:fld>
             <a:endParaRPr lang="en-US"/>
           </a:p>
@@ -5849,7 +6039,7 @@
           <a:p>
             <a:fld id="{699DC775-C286-4358-8C92-D7E584E969B3}" type="datetimeFigureOut">
               <a:rPr lang="en-US" smtClean="0"/>
-              <a:t>4/1/2018</a:t>
+              <a:t>4/11/2018</a:t>
             </a:fld>
             <a:endParaRPr lang="en-US"/>
           </a:p>
@@ -6132,7 +6322,7 @@
           <a:p>
             <a:fld id="{699DC775-C286-4358-8C92-D7E584E969B3}" type="datetimeFigureOut">
               <a:rPr lang="en-US" smtClean="0"/>
-              <a:t>4/1/2018</a:t>
+              <a:t>4/11/2018</a:t>
             </a:fld>
             <a:endParaRPr lang="en-US"/>
           </a:p>
@@ -6392,7 +6582,7 @@
           <a:p>
             <a:fld id="{699DC775-C286-4358-8C92-D7E584E969B3}" type="datetimeFigureOut">
               <a:rPr lang="en-US" smtClean="0"/>
-              <a:t>4/1/2018</a:t>
+              <a:t>4/11/2018</a:t>
             </a:fld>
             <a:endParaRPr lang="en-US"/>
           </a:p>
@@ -6568,7 +6758,7 @@
           <a:p>
             <a:fld id="{699DC775-C286-4358-8C92-D7E584E969B3}" type="datetimeFigureOut">
               <a:rPr lang="en-US" smtClean="0"/>
-              <a:t>4/1/2018</a:t>
+              <a:t>4/11/2018</a:t>
             </a:fld>
             <a:endParaRPr lang="en-US"/>
           </a:p>
@@ -6754,7 +6944,7 @@
           <a:p>
             <a:fld id="{699DC775-C286-4358-8C92-D7E584E969B3}" type="datetimeFigureOut">
               <a:rPr lang="en-US" smtClean="0"/>
-              <a:t>4/1/2018</a:t>
+              <a:t>4/11/2018</a:t>
             </a:fld>
             <a:endParaRPr lang="en-US"/>
           </a:p>
@@ -6944,7 +7134,7 @@
           <a:p>
             <a:fld id="{45696B32-6A70-48EC-8939-9D142D9557CD}" type="datetimeFigureOut">
               <a:rPr lang="en-US" smtClean="0"/>
-              <a:t>4/1/2018</a:t>
+              <a:t>4/11/2018</a:t>
             </a:fld>
             <a:endParaRPr lang="en-US"/>
           </a:p>
@@ -7258,7 +7448,7 @@
           <a:p>
             <a:fld id="{45696B32-6A70-48EC-8939-9D142D9557CD}" type="datetimeFigureOut">
               <a:rPr lang="en-US" smtClean="0"/>
-              <a:t>4/1/2018</a:t>
+              <a:t>4/11/2018</a:t>
             </a:fld>
             <a:endParaRPr lang="en-US"/>
           </a:p>
@@ -7503,7 +7693,7 @@
           <a:p>
             <a:fld id="{45696B32-6A70-48EC-8939-9D142D9557CD}" type="datetimeFigureOut">
               <a:rPr lang="en-US" smtClean="0"/>
-              <a:t>4/1/2018</a:t>
+              <a:t>4/11/2018</a:t>
             </a:fld>
             <a:endParaRPr lang="en-US"/>
           </a:p>
@@ -7732,7 +7922,7 @@
           <a:p>
             <a:fld id="{45696B32-6A70-48EC-8939-9D142D9557CD}" type="datetimeFigureOut">
               <a:rPr lang="en-US" smtClean="0"/>
-              <a:t>4/1/2018</a:t>
+              <a:t>4/11/2018</a:t>
             </a:fld>
             <a:endParaRPr lang="en-US"/>
           </a:p>
@@ -8096,7 +8286,7 @@
           <a:p>
             <a:fld id="{45696B32-6A70-48EC-8939-9D142D9557CD}" type="datetimeFigureOut">
               <a:rPr lang="en-US" smtClean="0"/>
-              <a:t>4/1/2018</a:t>
+              <a:t>4/11/2018</a:t>
             </a:fld>
             <a:endParaRPr lang="en-US"/>
           </a:p>
@@ -8213,7 +8403,7 @@
           <a:p>
             <a:fld id="{45696B32-6A70-48EC-8939-9D142D9557CD}" type="datetimeFigureOut">
               <a:rPr lang="en-US" smtClean="0"/>
-              <a:t>4/1/2018</a:t>
+              <a:t>4/11/2018</a:t>
             </a:fld>
             <a:endParaRPr lang="en-US"/>
           </a:p>
@@ -8498,7 +8688,7 @@
           <a:p>
             <a:fld id="{699DC775-C286-4358-8C92-D7E584E969B3}" type="datetimeFigureOut">
               <a:rPr lang="en-US" smtClean="0"/>
-              <a:t>4/1/2018</a:t>
+              <a:t>4/11/2018</a:t>
             </a:fld>
             <a:endParaRPr lang="en-US"/>
           </a:p>
@@ -8593,7 +8783,7 @@
           <a:p>
             <a:fld id="{45696B32-6A70-48EC-8939-9D142D9557CD}" type="datetimeFigureOut">
               <a:rPr lang="en-US" smtClean="0"/>
-              <a:t>4/1/2018</a:t>
+              <a:t>4/11/2018</a:t>
             </a:fld>
             <a:endParaRPr lang="en-US"/>
           </a:p>
@@ -8868,7 +9058,7 @@
           <a:p>
             <a:fld id="{45696B32-6A70-48EC-8939-9D142D9557CD}" type="datetimeFigureOut">
               <a:rPr lang="en-US" smtClean="0"/>
-              <a:t>4/1/2018</a:t>
+              <a:t>4/11/2018</a:t>
             </a:fld>
             <a:endParaRPr lang="en-US"/>
           </a:p>
@@ -9120,7 +9310,7 @@
           <a:p>
             <a:fld id="{45696B32-6A70-48EC-8939-9D142D9557CD}" type="datetimeFigureOut">
               <a:rPr lang="en-US" smtClean="0"/>
-              <a:t>4/1/2018</a:t>
+              <a:t>4/11/2018</a:t>
             </a:fld>
             <a:endParaRPr lang="en-US"/>
           </a:p>
@@ -9288,7 +9478,7 @@
           <a:p>
             <a:fld id="{45696B32-6A70-48EC-8939-9D142D9557CD}" type="datetimeFigureOut">
               <a:rPr lang="en-US" smtClean="0"/>
-              <a:t>4/1/2018</a:t>
+              <a:t>4/11/2018</a:t>
             </a:fld>
             <a:endParaRPr lang="en-US"/>
           </a:p>
@@ -9466,7 +9656,7 @@
           <a:p>
             <a:fld id="{45696B32-6A70-48EC-8939-9D142D9557CD}" type="datetimeFigureOut">
               <a:rPr lang="en-US" smtClean="0"/>
-              <a:t>4/1/2018</a:t>
+              <a:t>4/11/2018</a:t>
             </a:fld>
             <a:endParaRPr lang="en-US"/>
           </a:p>
@@ -9885,7 +10075,7 @@
           <a:p>
             <a:fld id="{699DC775-C286-4358-8C92-D7E584E969B3}" type="datetimeFigureOut">
               <a:rPr lang="en-US" smtClean="0"/>
-              <a:t>4/1/2018</a:t>
+              <a:t>4/11/2018</a:t>
             </a:fld>
             <a:endParaRPr lang="en-US"/>
           </a:p>
@@ -10002,7 +10192,7 @@
           <a:p>
             <a:fld id="{699DC775-C286-4358-8C92-D7E584E969B3}" type="datetimeFigureOut">
               <a:rPr lang="en-US" smtClean="0"/>
-              <a:t>4/1/2018</a:t>
+              <a:t>4/11/2018</a:t>
             </a:fld>
             <a:endParaRPr lang="en-US"/>
           </a:p>
@@ -10097,7 +10287,7 @@
           <a:p>
             <a:fld id="{699DC775-C286-4358-8C92-D7E584E969B3}" type="datetimeFigureOut">
               <a:rPr lang="en-US" smtClean="0"/>
-              <a:t>4/1/2018</a:t>
+              <a:t>4/11/2018</a:t>
             </a:fld>
             <a:endParaRPr lang="en-US"/>
           </a:p>
@@ -10372,7 +10562,7 @@
           <a:p>
             <a:fld id="{699DC775-C286-4358-8C92-D7E584E969B3}" type="datetimeFigureOut">
               <a:rPr lang="en-US" smtClean="0"/>
-              <a:t>4/1/2018</a:t>
+              <a:t>4/11/2018</a:t>
             </a:fld>
             <a:endParaRPr lang="en-US"/>
           </a:p>
@@ -10624,7 +10814,7 @@
           <a:p>
             <a:fld id="{699DC775-C286-4358-8C92-D7E584E969B3}" type="datetimeFigureOut">
               <a:rPr lang="en-US" smtClean="0"/>
-              <a:t>4/1/2018</a:t>
+              <a:t>4/11/2018</a:t>
             </a:fld>
             <a:endParaRPr lang="en-US"/>
           </a:p>
@@ -10835,7 +11025,7 @@
           <a:p>
             <a:fld id="{699DC775-C286-4358-8C92-D7E584E969B3}" type="datetimeFigureOut">
               <a:rPr lang="en-US" smtClean="0"/>
-              <a:t>4/1/2018</a:t>
+              <a:t>4/11/2018</a:t>
             </a:fld>
             <a:endParaRPr lang="en-US"/>
           </a:p>
@@ -11348,7 +11538,7 @@
           <a:p>
             <a:fld id="{699DC775-C286-4358-8C92-D7E584E969B3}" type="datetimeFigureOut">
               <a:rPr lang="en-US" smtClean="0"/>
-              <a:t>4/1/2018</a:t>
+              <a:t>4/11/2018</a:t>
             </a:fld>
             <a:endParaRPr lang="en-US"/>
           </a:p>
@@ -11859,7 +12049,7 @@
           <a:p>
             <a:fld id="{699DC775-C286-4358-8C92-D7E584E969B3}" type="datetimeFigureOut">
               <a:rPr lang="en-US" smtClean="0"/>
-              <a:t>4/1/2018</a:t>
+              <a:t>4/11/2018</a:t>
             </a:fld>
             <a:endParaRPr lang="en-US"/>
           </a:p>
@@ -12367,7 +12557,7 @@
           <a:p>
             <a:fld id="{45696B32-6A70-48EC-8939-9D142D9557CD}" type="datetimeFigureOut">
               <a:rPr lang="en-US" smtClean="0"/>
-              <a:t>4/1/2018</a:t>
+              <a:t>4/11/2018</a:t>
             </a:fld>
             <a:endParaRPr lang="en-US"/>
           </a:p>
@@ -13145,7 +13335,7 @@
       </p:grpSpPr>
       <p:pic>
         <p:nvPicPr>
-          <p:cNvPr id="10" name="Picture 9"/>
+          <p:cNvPr id="10" name="Destination"/>
           <p:cNvPicPr>
             <a:picLocks noChangeAspect="1"/>
           </p:cNvPicPr>
@@ -13165,8 +13355,8 @@
         </p:blipFill>
         <p:spPr>
           <a:xfrm>
-            <a:off x="1447800" y="4572000"/>
-            <a:ext cx="1853345" cy="1243692"/>
+            <a:off x="381000" y="1920010"/>
+            <a:ext cx="4519750" cy="3032990"/>
           </a:xfrm>
           <a:prstGeom prst="rect">
             <a:avLst/>
@@ -13175,7 +13365,13 @@
       </p:pic>
       <p:pic>
         <p:nvPicPr>
-          <p:cNvPr id="11" name="Picture 10"/>
+          <p:cNvPr id="3" name="Source">
+            <a:extLst>
+              <a:ext uri="{FF2B5EF4-FFF2-40B4-BE49-F238E27FC236}">
+                <a16:creationId xmlns:a16="http://schemas.microsoft.com/office/drawing/2014/main" id="{49035B3A-B2AF-4ADC-AF11-DA5604243147}"/>
+              </a:ext>
+            </a:extLst>
+          </p:cNvPr>
           <p:cNvPicPr>
             <a:picLocks noChangeAspect="1"/>
           </p:cNvPicPr>
@@ -13188,56 +13384,7 @@
                 <a14:imgProps xmlns:a14="http://schemas.microsoft.com/office/drawing/2010/main">
                   <a14:imgLayer r:embed="rId5">
                     <a14:imgEffect>
-                      <a14:artisticChalkSketch/>
-                    </a14:imgEffect>
-                  </a14:imgLayer>
-                </a14:imgProps>
-              </a:ext>
-              <a:ext uri="{28A0092B-C50C-407E-A947-70E740481C1C}">
-                <a14:useLocalDpi xmlns:a14="http://schemas.microsoft.com/office/drawing/2010/main" val="0"/>
-              </a:ext>
-            </a:extLst>
-          </a:blip>
-          <a:stretch>
-            <a:fillRect/>
-          </a:stretch>
-        </p:blipFill>
-        <p:spPr>
-          <a:xfrm>
-            <a:off x="1676400" y="914400"/>
-            <a:ext cx="2158171" cy="2213040"/>
-          </a:xfrm>
-          <a:prstGeom prst="rect">
-            <a:avLst/>
-          </a:prstGeom>
-          <a:noFill/>
-          <a:ln>
-            <a:noFill/>
-          </a:ln>
-        </p:spPr>
-      </p:pic>
-      <p:pic>
-        <p:nvPicPr>
-          <p:cNvPr id="3" name="Picture 2">
-            <a:extLst>
-              <a:ext uri="{FF2B5EF4-FFF2-40B4-BE49-F238E27FC236}">
-                <a16:creationId xmlns:a16="http://schemas.microsoft.com/office/drawing/2014/main" xmlns="" id="{49035B3A-B2AF-4ADC-AF11-DA5604243147}"/>
-              </a:ext>
-            </a:extLst>
-          </p:cNvPr>
-          <p:cNvPicPr>
-            <a:picLocks noChangeAspect="1"/>
-          </p:cNvPicPr>
-          <p:nvPr/>
-        </p:nvPicPr>
-        <p:blipFill>
-          <a:blip r:embed="rId6">
-            <a:extLst>
-              <a:ext uri="{BEBA8EAE-BF5A-486C-A8C5-ECC9F3942E4B}">
-                <a14:imgProps xmlns:a14="http://schemas.microsoft.com/office/drawing/2010/main">
-                  <a14:imgLayer r:embed="rId7">
-                    <a14:imgEffect>
-                      <a14:artisticLightScreen/>
+                      <a14:artisticGlowEdges/>
                     </a14:imgEffect>
                   </a14:imgLayer>
                 </a14:imgProps>
@@ -13270,7 +13417,7 @@
     </p:spTree>
     <p:extLst>
       <p:ext uri="{BB962C8B-B14F-4D97-AF65-F5344CB8AC3E}">
-        <p14:creationId xmlns:p14="http://schemas.microsoft.com/office/powerpoint/2010/main" val="3658852901"/>
+        <p14:creationId xmlns:p14="http://schemas.microsoft.com/office/powerpoint/2010/main" val="2253802740"/>
       </p:ext>
     </p:extLst>
   </p:cSld>
@@ -13299,7 +13446,7 @@
       </p:grpSpPr>
       <p:pic>
         <p:nvPicPr>
-          <p:cNvPr id="5" name="Picture 10"/>
+          <p:cNvPr id="10" name="Destination"/>
           <p:cNvPicPr>
             <a:picLocks noChangeAspect="1"/>
           </p:cNvPicPr>
@@ -13312,7 +13459,7 @@
                 <a14:imgProps xmlns:a14="http://schemas.microsoft.com/office/drawing/2010/main">
                   <a14:imgLayer r:embed="rId4">
                     <a14:imgEffect>
-                      <a14:artisticChalkSketch/>
+                      <a14:artisticGlowEdges/>
                     </a14:imgEffect>
                   </a14:imgLayer>
                 </a14:imgProps>
@@ -13328,24 +13475,20 @@
         </p:blipFill>
         <p:spPr>
           <a:xfrm>
-            <a:off x="1676400" y="914400"/>
-            <a:ext cx="2158171" cy="2213040"/>
+            <a:off x="381000" y="1920010"/>
+            <a:ext cx="4519750" cy="3032990"/>
           </a:xfrm>
           <a:prstGeom prst="rect">
             <a:avLst/>
           </a:prstGeom>
-          <a:noFill/>
-          <a:ln>
-            <a:noFill/>
-          </a:ln>
         </p:spPr>
       </p:pic>
       <p:pic>
         <p:nvPicPr>
-          <p:cNvPr id="7" name="Picture 9">
+          <p:cNvPr id="3" name="Source">
             <a:extLst>
               <a:ext uri="{FF2B5EF4-FFF2-40B4-BE49-F238E27FC236}">
-                <a16:creationId xmlns:a16="http://schemas.microsoft.com/office/drawing/2014/main" xmlns="" id="{5E29A09D-51C3-4A59-A3F7-3FFB061A2C52}"/>
+                <a16:creationId xmlns:a16="http://schemas.microsoft.com/office/drawing/2014/main" id="{49035B3A-B2AF-4ADC-AF11-DA5604243147}"/>
               </a:ext>
             </a:extLst>
           </p:cNvPr>
@@ -13361,52 +13504,7 @@
                 <a14:imgProps xmlns:a14="http://schemas.microsoft.com/office/drawing/2010/main">
                   <a14:imgLayer r:embed="rId6">
                     <a14:imgEffect>
-                      <a14:artisticLightScreen/>
-                    </a14:imgEffect>
-                  </a14:imgLayer>
-                </a14:imgProps>
-              </a:ext>
-              <a:ext uri="{28A0092B-C50C-407E-A947-70E740481C1C}">
-                <a14:useLocalDpi xmlns:a14="http://schemas.microsoft.com/office/drawing/2010/main" val="0"/>
-              </a:ext>
-            </a:extLst>
-          </a:blip>
-          <a:stretch>
-            <a:fillRect/>
-          </a:stretch>
-        </p:blipFill>
-        <p:spPr>
-          <a:xfrm>
-            <a:off x="1447800" y="4572000"/>
-            <a:ext cx="1853345" cy="1243692"/>
-          </a:xfrm>
-          <a:prstGeom prst="rect">
-            <a:avLst/>
-          </a:prstGeom>
-        </p:spPr>
-      </p:pic>
-      <p:pic>
-        <p:nvPicPr>
-          <p:cNvPr id="8" name="Picture 2">
-            <a:extLst>
-              <a:ext uri="{FF2B5EF4-FFF2-40B4-BE49-F238E27FC236}">
-                <a16:creationId xmlns:a16="http://schemas.microsoft.com/office/drawing/2014/main" xmlns="" id="{6A9FA026-AC61-47F9-89A9-A411F9AF0321}"/>
-              </a:ext>
-            </a:extLst>
-          </p:cNvPr>
-          <p:cNvPicPr>
-            <a:picLocks noChangeAspect="1"/>
-          </p:cNvPicPr>
-          <p:nvPr/>
-        </p:nvPicPr>
-        <p:blipFill>
-          <a:blip r:embed="rId7">
-            <a:extLst>
-              <a:ext uri="{BEBA8EAE-BF5A-486C-A8C5-ECC9F3942E4B}">
-                <a14:imgProps xmlns:a14="http://schemas.microsoft.com/office/drawing/2010/main">
-                  <a14:imgLayer r:embed="rId8">
-                    <a14:imgEffect>
-                      <a14:artisticLightScreen/>
+                      <a14:artisticGlowEdges/>
                     </a14:imgEffect>
                   </a14:imgLayer>
                 </a14:imgProps>
@@ -13428,12 +13526,18 @@
           <a:prstGeom prst="rect">
             <a:avLst/>
           </a:prstGeom>
+          <a:solidFill>
+            <a:scrgbClr r="0" g="0" b="0">
+              <a:alpha val="0"/>
+            </a:scrgbClr>
+          </a:solidFill>
+          <a:ln/>
         </p:spPr>
       </p:pic>
     </p:spTree>
     <p:extLst>
       <p:ext uri="{BB962C8B-B14F-4D97-AF65-F5344CB8AC3E}">
-        <p14:creationId xmlns:p14="http://schemas.microsoft.com/office/powerpoint/2010/main" val="263783307"/>
+        <p14:creationId xmlns:p14="http://schemas.microsoft.com/office/powerpoint/2010/main" val="370039080"/>
       </p:ext>
     </p:extLst>
   </p:cSld>
@@ -13462,7 +13566,7 @@
       </p:grpSpPr>
       <p:pic>
         <p:nvPicPr>
-          <p:cNvPr id="10" name="Picture 9"/>
+          <p:cNvPr id="11" name="Destination"/>
           <p:cNvPicPr>
             <a:picLocks noChangeAspect="1"/>
           </p:cNvPicPr>
@@ -13471,39 +13575,9 @@
         <p:blipFill>
           <a:blip r:embed="rId3">
             <a:extLst>
-              <a:ext uri="{28A0092B-C50C-407E-A947-70E740481C1C}">
-                <a14:useLocalDpi xmlns:a14="http://schemas.microsoft.com/office/drawing/2010/main" val="0"/>
-              </a:ext>
-            </a:extLst>
-          </a:blip>
-          <a:stretch>
-            <a:fillRect/>
-          </a:stretch>
-        </p:blipFill>
-        <p:spPr>
-          <a:xfrm>
-            <a:off x="1447800" y="4572000"/>
-            <a:ext cx="1853345" cy="1243692"/>
-          </a:xfrm>
-          <a:prstGeom prst="rect">
-            <a:avLst/>
-          </a:prstGeom>
-        </p:spPr>
-      </p:pic>
-      <p:pic>
-        <p:nvPicPr>
-          <p:cNvPr id="11" name="Picture 10"/>
-          <p:cNvPicPr>
-            <a:picLocks noChangeAspect="1"/>
-          </p:cNvPicPr>
-          <p:nvPr/>
-        </p:nvPicPr>
-        <p:blipFill>
-          <a:blip r:embed="rId4">
-            <a:extLst>
               <a:ext uri="{BEBA8EAE-BF5A-486C-A8C5-ECC9F3942E4B}">
                 <a14:imgProps xmlns:a14="http://schemas.microsoft.com/office/drawing/2010/main">
-                  <a14:imgLayer r:embed="rId5">
+                  <a14:imgLayer r:embed="rId4">
                     <a14:imgEffect>
                       <a14:artisticPencilGrayscale/>
                     </a14:imgEffect>
@@ -13531,10 +13605,10 @@
       </p:pic>
       <p:pic>
         <p:nvPicPr>
-          <p:cNvPr id="3" name="Picture 2">
+          <p:cNvPr id="3" name="Source">
             <a:extLst>
               <a:ext uri="{FF2B5EF4-FFF2-40B4-BE49-F238E27FC236}">
-                <a16:creationId xmlns:a16="http://schemas.microsoft.com/office/drawing/2014/main" xmlns="" id="{49035B3A-B2AF-4ADC-AF11-DA5604243147}"/>
+                <a16:creationId xmlns:a16="http://schemas.microsoft.com/office/drawing/2014/main" id="{49035B3A-B2AF-4ADC-AF11-DA5604243147}"/>
               </a:ext>
             </a:extLst>
           </p:cNvPr>
@@ -13544,11 +13618,11 @@
           <p:nvPr/>
         </p:nvPicPr>
         <p:blipFill>
-          <a:blip r:embed="rId6">
+          <a:blip r:embed="rId5">
             <a:extLst>
               <a:ext uri="{BEBA8EAE-BF5A-486C-A8C5-ECC9F3942E4B}">
                 <a14:imgProps xmlns:a14="http://schemas.microsoft.com/office/drawing/2010/main">
-                  <a14:imgLayer r:embed="rId7">
+                  <a14:imgLayer r:embed="rId6">
                     <a14:imgEffect>
                       <a14:artisticPlasticWrap/>
                     </a14:imgEffect>
@@ -13612,40 +13686,10 @@
       </p:grpSpPr>
       <p:pic>
         <p:nvPicPr>
-          <p:cNvPr id="10" name="Picture 9"/>
-          <p:cNvPicPr>
-            <a:picLocks noChangeAspect="1"/>
-          </p:cNvPicPr>
-          <p:nvPr/>
-        </p:nvPicPr>
-        <p:blipFill>
-          <a:blip r:embed="rId3">
-            <a:extLst>
-              <a:ext uri="{28A0092B-C50C-407E-A947-70E740481C1C}">
-                <a14:useLocalDpi xmlns:a14="http://schemas.microsoft.com/office/drawing/2010/main" val="0"/>
-              </a:ext>
-            </a:extLst>
-          </a:blip>
-          <a:stretch>
-            <a:fillRect/>
-          </a:stretch>
-        </p:blipFill>
-        <p:spPr>
-          <a:xfrm>
-            <a:off x="1447800" y="4572000"/>
-            <a:ext cx="1853345" cy="1243692"/>
-          </a:xfrm>
-          <a:prstGeom prst="rect">
-            <a:avLst/>
-          </a:prstGeom>
-        </p:spPr>
-      </p:pic>
-      <p:pic>
-        <p:nvPicPr>
-          <p:cNvPr id="5" name="Picture 10">
+          <p:cNvPr id="5" name="Destination">
             <a:extLst>
               <a:ext uri="{FF2B5EF4-FFF2-40B4-BE49-F238E27FC236}">
-                <a16:creationId xmlns:a16="http://schemas.microsoft.com/office/drawing/2014/main" xmlns="" id="{AECA02F7-4DF0-497B-8866-58B707D41DB9}"/>
+                <a16:creationId xmlns:a16="http://schemas.microsoft.com/office/drawing/2014/main" id="{AECA02F7-4DF0-497B-8866-58B707D41DB9}"/>
               </a:ext>
             </a:extLst>
           </p:cNvPr>
@@ -13655,11 +13699,11 @@
           <p:nvPr/>
         </p:nvPicPr>
         <p:blipFill>
-          <a:blip r:embed="rId4">
+          <a:blip r:embed="rId3">
             <a:extLst>
               <a:ext uri="{BEBA8EAE-BF5A-486C-A8C5-ECC9F3942E4B}">
                 <a14:imgProps xmlns:a14="http://schemas.microsoft.com/office/drawing/2010/main">
-                  <a14:imgLayer r:embed="rId5">
+                  <a14:imgLayer r:embed="rId4">
                     <a14:imgEffect>
                       <a14:artisticPlasticWrap/>
                     </a14:imgEffect>
@@ -13687,10 +13731,10 @@
       </p:pic>
       <p:pic>
         <p:nvPicPr>
-          <p:cNvPr id="7" name="Picture 2">
+          <p:cNvPr id="7" name="Source">
             <a:extLst>
               <a:ext uri="{FF2B5EF4-FFF2-40B4-BE49-F238E27FC236}">
-                <a16:creationId xmlns:a16="http://schemas.microsoft.com/office/drawing/2014/main" xmlns="" id="{FD1D0125-836D-42C9-B28B-D0B346D8D9B8}"/>
+                <a16:creationId xmlns:a16="http://schemas.microsoft.com/office/drawing/2014/main" id="{FD1D0125-836D-42C9-B28B-D0B346D8D9B8}"/>
               </a:ext>
             </a:extLst>
           </p:cNvPr>
@@ -13700,11 +13744,11 @@
           <p:nvPr/>
         </p:nvPicPr>
         <p:blipFill>
-          <a:blip r:embed="rId6">
+          <a:blip r:embed="rId5">
             <a:extLst>
               <a:ext uri="{BEBA8EAE-BF5A-486C-A8C5-ECC9F3942E4B}">
                 <a14:imgProps xmlns:a14="http://schemas.microsoft.com/office/drawing/2010/main">
-                  <a14:imgLayer r:embed="rId7">
+                  <a14:imgLayer r:embed="rId6">
                     <a14:imgEffect>
                       <a14:artisticPlasticWrap/>
                     </a14:imgEffect>
@@ -13734,6 +13778,237 @@
     <p:extLst>
       <p:ext uri="{BB962C8B-B14F-4D97-AF65-F5344CB8AC3E}">
         <p14:creationId xmlns:p14="http://schemas.microsoft.com/office/powerpoint/2010/main" val="182493782"/>
+      </p:ext>
+    </p:extLst>
+  </p:cSld>
+  <p:clrMapOvr>
+    <a:masterClrMapping/>
+  </p:clrMapOvr>
+</p:sld>
+</file>
+
+<file path=ppt/slides/slide8.xml><?xml version="1.0" encoding="utf-8"?>
+<p:sld xmlns:a="http://schemas.openxmlformats.org/drawingml/2006/main" xmlns:r="http://schemas.openxmlformats.org/officeDocument/2006/relationships" xmlns:p="http://schemas.openxmlformats.org/presentationml/2006/main">
+  <p:cSld>
+    <p:spTree>
+      <p:nvGrpSpPr>
+        <p:cNvPr id="1" name=""/>
+        <p:cNvGrpSpPr/>
+        <p:nvPr/>
+      </p:nvGrpSpPr>
+      <p:grpSpPr>
+        <a:xfrm>
+          <a:off x="0" y="0"/>
+          <a:ext cx="0" cy="0"/>
+          <a:chOff x="0" y="0"/>
+          <a:chExt cx="0" cy="0"/>
+        </a:xfrm>
+      </p:grpSpPr>
+      <p:pic>
+        <p:nvPicPr>
+          <p:cNvPr id="10" name="Destination"/>
+          <p:cNvPicPr>
+            <a:picLocks noChangeAspect="1"/>
+          </p:cNvPicPr>
+          <p:nvPr/>
+        </p:nvPicPr>
+        <p:blipFill>
+          <a:blip r:embed="rId3">
+            <a:extLst>
+              <a:ext uri="{28A0092B-C50C-407E-A947-70E740481C1C}">
+                <a14:useLocalDpi xmlns:a14="http://schemas.microsoft.com/office/drawing/2010/main" val="0"/>
+              </a:ext>
+            </a:extLst>
+          </a:blip>
+          <a:stretch>
+            <a:fillRect/>
+          </a:stretch>
+        </p:blipFill>
+        <p:spPr>
+          <a:xfrm>
+            <a:off x="381000" y="1920010"/>
+            <a:ext cx="4519750" cy="3032990"/>
+          </a:xfrm>
+          <a:prstGeom prst="rect">
+            <a:avLst/>
+          </a:prstGeom>
+        </p:spPr>
+      </p:pic>
+      <p:pic>
+        <p:nvPicPr>
+          <p:cNvPr id="3" name="Source">
+            <a:extLst>
+              <a:ext uri="{FF2B5EF4-FFF2-40B4-BE49-F238E27FC236}">
+                <a16:creationId xmlns:a16="http://schemas.microsoft.com/office/drawing/2014/main" id="{49035B3A-B2AF-4ADC-AF11-DA5604243147}"/>
+              </a:ext>
+            </a:extLst>
+          </p:cNvPr>
+          <p:cNvPicPr>
+            <a:picLocks noChangeAspect="1"/>
+          </p:cNvPicPr>
+          <p:nvPr/>
+        </p:nvPicPr>
+        <p:blipFill>
+          <a:blip r:embed="rId4">
+            <a:extLst>
+              <a:ext uri="{BEBA8EAE-BF5A-486C-A8C5-ECC9F3942E4B}">
+                <a14:imgProps xmlns:a14="http://schemas.microsoft.com/office/drawing/2010/main">
+                  <a14:imgLayer r:embed="rId5">
+                    <a14:imgEffect>
+                      <a14:artisticGlowEdges/>
+                    </a14:imgEffect>
+                  </a14:imgLayer>
+                </a14:imgProps>
+              </a:ext>
+              <a:ext uri="{28A0092B-C50C-407E-A947-70E740481C1C}">
+                <a14:useLocalDpi xmlns:a14="http://schemas.microsoft.com/office/drawing/2010/main" val="0"/>
+              </a:ext>
+            </a:extLst>
+          </a:blip>
+          <a:stretch>
+            <a:fillRect/>
+          </a:stretch>
+        </p:blipFill>
+        <p:spPr>
+          <a:xfrm>
+            <a:off x="6096000" y="1920010"/>
+            <a:ext cx="2261812" cy="3273836"/>
+          </a:xfrm>
+          <a:prstGeom prst="rect">
+            <a:avLst/>
+          </a:prstGeom>
+          <a:solidFill>
+            <a:scrgbClr r="0" g="0" b="0">
+              <a:alpha val="0"/>
+            </a:scrgbClr>
+          </a:solidFill>
+          <a:ln/>
+        </p:spPr>
+      </p:pic>
+    </p:spTree>
+    <p:extLst>
+      <p:ext uri="{BB962C8B-B14F-4D97-AF65-F5344CB8AC3E}">
+        <p14:creationId xmlns:p14="http://schemas.microsoft.com/office/powerpoint/2010/main" val="2524781867"/>
+      </p:ext>
+    </p:extLst>
+  </p:cSld>
+  <p:clrMapOvr>
+    <a:masterClrMapping/>
+  </p:clrMapOvr>
+</p:sld>
+</file>
+
+<file path=ppt/slides/slide9.xml><?xml version="1.0" encoding="utf-8"?>
+<p:sld xmlns:a="http://schemas.openxmlformats.org/drawingml/2006/main" xmlns:r="http://schemas.openxmlformats.org/officeDocument/2006/relationships" xmlns:p="http://schemas.openxmlformats.org/presentationml/2006/main">
+  <p:cSld>
+    <p:spTree>
+      <p:nvGrpSpPr>
+        <p:cNvPr id="1" name=""/>
+        <p:cNvGrpSpPr/>
+        <p:nvPr/>
+      </p:nvGrpSpPr>
+      <p:grpSpPr>
+        <a:xfrm>
+          <a:off x="0" y="0"/>
+          <a:ext cx="0" cy="0"/>
+          <a:chOff x="0" y="0"/>
+          <a:chExt cx="0" cy="0"/>
+        </a:xfrm>
+      </p:grpSpPr>
+      <p:pic>
+        <p:nvPicPr>
+          <p:cNvPr id="10" name="Destination"/>
+          <p:cNvPicPr>
+            <a:picLocks noChangeAspect="1"/>
+          </p:cNvPicPr>
+          <p:nvPr/>
+        </p:nvPicPr>
+        <p:blipFill>
+          <a:blip r:embed="rId3">
+            <a:extLst>
+              <a:ext uri="{BEBA8EAE-BF5A-486C-A8C5-ECC9F3942E4B}">
+                <a14:imgProps xmlns:a14="http://schemas.microsoft.com/office/drawing/2010/main">
+                  <a14:imgLayer r:embed="rId4">
+                    <a14:imgEffect>
+                      <a14:artisticGlowEdges/>
+                    </a14:imgEffect>
+                  </a14:imgLayer>
+                </a14:imgProps>
+              </a:ext>
+              <a:ext uri="{28A0092B-C50C-407E-A947-70E740481C1C}">
+                <a14:useLocalDpi xmlns:a14="http://schemas.microsoft.com/office/drawing/2010/main" val="0"/>
+              </a:ext>
+            </a:extLst>
+          </a:blip>
+          <a:stretch>
+            <a:fillRect/>
+          </a:stretch>
+        </p:blipFill>
+        <p:spPr>
+          <a:xfrm>
+            <a:off x="381000" y="1920010"/>
+            <a:ext cx="4519750" cy="3032990"/>
+          </a:xfrm>
+          <a:prstGeom prst="rect">
+            <a:avLst/>
+          </a:prstGeom>
+        </p:spPr>
+      </p:pic>
+      <p:pic>
+        <p:nvPicPr>
+          <p:cNvPr id="3" name="Source">
+            <a:extLst>
+              <a:ext uri="{FF2B5EF4-FFF2-40B4-BE49-F238E27FC236}">
+                <a16:creationId xmlns:a16="http://schemas.microsoft.com/office/drawing/2014/main" id="{49035B3A-B2AF-4ADC-AF11-DA5604243147}"/>
+              </a:ext>
+            </a:extLst>
+          </p:cNvPr>
+          <p:cNvPicPr>
+            <a:picLocks noChangeAspect="1"/>
+          </p:cNvPicPr>
+          <p:nvPr/>
+        </p:nvPicPr>
+        <p:blipFill>
+          <a:blip r:embed="rId5">
+            <a:extLst>
+              <a:ext uri="{BEBA8EAE-BF5A-486C-A8C5-ECC9F3942E4B}">
+                <a14:imgProps xmlns:a14="http://schemas.microsoft.com/office/drawing/2010/main">
+                  <a14:imgLayer r:embed="rId6">
+                    <a14:imgEffect>
+                      <a14:artisticGlowEdges/>
+                    </a14:imgEffect>
+                  </a14:imgLayer>
+                </a14:imgProps>
+              </a:ext>
+              <a:ext uri="{28A0092B-C50C-407E-A947-70E740481C1C}">
+                <a14:useLocalDpi xmlns:a14="http://schemas.microsoft.com/office/drawing/2010/main" val="0"/>
+              </a:ext>
+            </a:extLst>
+          </a:blip>
+          <a:stretch>
+            <a:fillRect/>
+          </a:stretch>
+        </p:blipFill>
+        <p:spPr>
+          <a:xfrm>
+            <a:off x="6096000" y="1920010"/>
+            <a:ext cx="2261812" cy="3273836"/>
+          </a:xfrm>
+          <a:prstGeom prst="rect">
+            <a:avLst/>
+          </a:prstGeom>
+          <a:solidFill>
+            <a:scrgbClr r="0" g="0" b="0">
+              <a:alpha val="0"/>
+            </a:scrgbClr>
+          </a:solidFill>
+          <a:ln/>
+        </p:spPr>
+      </p:pic>
+    </p:spTree>
+    <p:extLst>
+      <p:ext uri="{BB962C8B-B14F-4D97-AF65-F5344CB8AC3E}">
+        <p14:creationId xmlns:p14="http://schemas.microsoft.com/office/powerpoint/2010/main" val="2730207054"/>
       </p:ext>
     </p:extLst>
   </p:cSld>

</xml_diff>